<commit_message>
slides: minor updates ; new: schedule and required tools added
</commit_message>
<xml_diff>
--- a/slides/rst.pptx
+++ b/slides/rst.pptx
@@ -207,7 +207,7 @@
           <a:p>
             <a:fld id="{90D4793D-962B-AE4B-9653-ECCE89FFBBCD}" type="datetimeFigureOut">
               <a:rPr lang="en-US" smtClean="0"/>
-              <a:t>5/1/20</a:t>
+              <a:t>5/9/20</a:t>
             </a:fld>
             <a:endParaRPr lang="en-US"/>
           </a:p>
@@ -753,7 +753,7 @@
           <a:p>
             <a:fld id="{51673806-0BCD-1F42-BAA8-2011034B3C6A}" type="datetimeFigureOut">
               <a:rPr lang="en-US" smtClean="0"/>
-              <a:t>5/1/20</a:t>
+              <a:t>5/9/20</a:t>
             </a:fld>
             <a:endParaRPr lang="en-US"/>
           </a:p>
@@ -1167,7 +1167,7 @@
           <a:p>
             <a:fld id="{51673806-0BCD-1F42-BAA8-2011034B3C6A}" type="datetimeFigureOut">
               <a:rPr lang="en-US" smtClean="0"/>
-              <a:t>5/1/20</a:t>
+              <a:t>5/9/20</a:t>
             </a:fld>
             <a:endParaRPr lang="en-US"/>
           </a:p>
@@ -1498,7 +1498,7 @@
           <a:p>
             <a:fld id="{51673806-0BCD-1F42-BAA8-2011034B3C6A}" type="datetimeFigureOut">
               <a:rPr lang="en-US" smtClean="0"/>
-              <a:t>5/1/20</a:t>
+              <a:t>5/9/20</a:t>
             </a:fld>
             <a:endParaRPr lang="en-US"/>
           </a:p>
@@ -1898,7 +1898,7 @@
           <a:p>
             <a:fld id="{51673806-0BCD-1F42-BAA8-2011034B3C6A}" type="datetimeFigureOut">
               <a:rPr lang="en-US" smtClean="0"/>
-              <a:t>5/1/20</a:t>
+              <a:t>5/9/20</a:t>
             </a:fld>
             <a:endParaRPr lang="en-US"/>
           </a:p>
@@ -2461,7 +2461,7 @@
           <a:p>
             <a:fld id="{51673806-0BCD-1F42-BAA8-2011034B3C6A}" type="datetimeFigureOut">
               <a:rPr lang="en-US" smtClean="0"/>
-              <a:t>5/1/20</a:t>
+              <a:t>5/9/20</a:t>
             </a:fld>
             <a:endParaRPr lang="en-US"/>
           </a:p>
@@ -3137,7 +3137,7 @@
           <a:p>
             <a:fld id="{51673806-0BCD-1F42-BAA8-2011034B3C6A}" type="datetimeFigureOut">
               <a:rPr lang="en-US" smtClean="0"/>
-              <a:t>5/1/20</a:t>
+              <a:t>5/9/20</a:t>
             </a:fld>
             <a:endParaRPr lang="en-US"/>
           </a:p>
@@ -4045,7 +4045,7 @@
           <a:p>
             <a:fld id="{51673806-0BCD-1F42-BAA8-2011034B3C6A}" type="datetimeFigureOut">
               <a:rPr lang="en-US" smtClean="0"/>
-              <a:t>5/1/20</a:t>
+              <a:t>5/9/20</a:t>
             </a:fld>
             <a:endParaRPr lang="en-US"/>
           </a:p>
@@ -4353,7 +4353,7 @@
           <a:p>
             <a:fld id="{51673806-0BCD-1F42-BAA8-2011034B3C6A}" type="datetimeFigureOut">
               <a:rPr lang="en-US" smtClean="0"/>
-              <a:t>5/1/20</a:t>
+              <a:t>5/9/20</a:t>
             </a:fld>
             <a:endParaRPr lang="en-US"/>
           </a:p>
@@ -4612,7 +4612,7 @@
           <a:p>
             <a:fld id="{51673806-0BCD-1F42-BAA8-2011034B3C6A}" type="datetimeFigureOut">
               <a:rPr lang="en-US" smtClean="0"/>
-              <a:t>5/1/20</a:t>
+              <a:t>5/9/20</a:t>
             </a:fld>
             <a:endParaRPr lang="en-US"/>
           </a:p>
@@ -4935,7 +4935,7 @@
           <a:p>
             <a:fld id="{51673806-0BCD-1F42-BAA8-2011034B3C6A}" type="datetimeFigureOut">
               <a:rPr lang="en-US" smtClean="0"/>
-              <a:t>5/1/20</a:t>
+              <a:t>5/9/20</a:t>
             </a:fld>
             <a:endParaRPr lang="en-US"/>
           </a:p>
@@ -5319,7 +5319,7 @@
           <a:p>
             <a:fld id="{51673806-0BCD-1F42-BAA8-2011034B3C6A}" type="datetimeFigureOut">
               <a:rPr lang="en-US" smtClean="0"/>
-              <a:t>5/1/20</a:t>
+              <a:t>5/9/20</a:t>
             </a:fld>
             <a:endParaRPr lang="en-US"/>
           </a:p>
@@ -5695,7 +5695,7 @@
           <a:p>
             <a:fld id="{51673806-0BCD-1F42-BAA8-2011034B3C6A}" type="datetimeFigureOut">
               <a:rPr lang="en-US" smtClean="0"/>
-              <a:t>5/1/20</a:t>
+              <a:t>5/9/20</a:t>
             </a:fld>
             <a:endParaRPr lang="en-US"/>
           </a:p>
@@ -6201,7 +6201,7 @@
           <a:p>
             <a:fld id="{51673806-0BCD-1F42-BAA8-2011034B3C6A}" type="datetimeFigureOut">
               <a:rPr lang="en-US" smtClean="0"/>
-              <a:t>5/1/20</a:t>
+              <a:t>5/9/20</a:t>
             </a:fld>
             <a:endParaRPr lang="en-US"/>
           </a:p>
@@ -6458,7 +6458,7 @@
           <a:p>
             <a:fld id="{51673806-0BCD-1F42-BAA8-2011034B3C6A}" type="datetimeFigureOut">
               <a:rPr lang="en-US" smtClean="0"/>
-              <a:t>5/1/20</a:t>
+              <a:t>5/9/20</a:t>
             </a:fld>
             <a:endParaRPr lang="en-US"/>
           </a:p>
@@ -6616,7 +6616,7 @@
           <a:p>
             <a:fld id="{51673806-0BCD-1F42-BAA8-2011034B3C6A}" type="datetimeFigureOut">
               <a:rPr lang="en-US" smtClean="0"/>
-              <a:t>5/1/20</a:t>
+              <a:t>5/9/20</a:t>
             </a:fld>
             <a:endParaRPr lang="en-US"/>
           </a:p>
@@ -7006,7 +7006,7 @@
           <a:p>
             <a:fld id="{51673806-0BCD-1F42-BAA8-2011034B3C6A}" type="datetimeFigureOut">
               <a:rPr lang="en-US" smtClean="0"/>
-              <a:t>5/1/20</a:t>
+              <a:t>5/9/20</a:t>
             </a:fld>
             <a:endParaRPr lang="en-US"/>
           </a:p>
@@ -7415,7 +7415,7 @@
           <a:p>
             <a:fld id="{51673806-0BCD-1F42-BAA8-2011034B3C6A}" type="datetimeFigureOut">
               <a:rPr lang="en-US" smtClean="0"/>
-              <a:t>5/1/20</a:t>
+              <a:t>5/9/20</a:t>
             </a:fld>
             <a:endParaRPr lang="en-US"/>
           </a:p>
@@ -7663,7 +7663,7 @@
             <a:fld id="{51673806-0BCD-1F42-BAA8-2011034B3C6A}" type="datetimeFigureOut">
               <a:rPr lang="en-US" smtClean="0"/>
               <a:pPr/>
-              <a:t>5/1/20</a:t>
+              <a:t>5/9/20</a:t>
             </a:fld>
             <a:endParaRPr lang="en-US" dirty="0"/>
           </a:p>

</xml_diff>

<commit_message>
slides: markdown added to documentation material; plan to cover GitHub in final session
</commit_message>
<xml_diff>
--- a/slides/rst.pptx
+++ b/slides/rst.pptx
@@ -5,7 +5,7 @@
     <p:sldMasterId id="2147484294" r:id="rId1"/>
   </p:sldMasterIdLst>
   <p:notesMasterIdLst>
-    <p:notesMasterId r:id="rId13"/>
+    <p:notesMasterId r:id="rId17"/>
   </p:notesMasterIdLst>
   <p:sldIdLst>
     <p:sldId id="256" r:id="rId2"/>
@@ -19,6 +19,10 @@
     <p:sldId id="263" r:id="rId10"/>
     <p:sldId id="264" r:id="rId11"/>
     <p:sldId id="266" r:id="rId12"/>
+    <p:sldId id="267" r:id="rId13"/>
+    <p:sldId id="268" r:id="rId14"/>
+    <p:sldId id="269" r:id="rId15"/>
+    <p:sldId id="270" r:id="rId16"/>
   </p:sldIdLst>
   <p:sldSz cx="12192000" cy="6858000"/>
   <p:notesSz cx="6858000" cy="9144000"/>
@@ -207,7 +211,7 @@
           <a:p>
             <a:fld id="{90D4793D-962B-AE4B-9653-ECCE89FFBBCD}" type="datetimeFigureOut">
               <a:rPr lang="en-US" smtClean="0"/>
-              <a:t>5/8/22</a:t>
+              <a:t>5/10/22</a:t>
             </a:fld>
             <a:endParaRPr lang="en-US"/>
           </a:p>
@@ -520,13 +524,8 @@
           <a:p>
             <a:r>
               <a:rPr lang="en-US" dirty="0"/>
-              <a:t>Note that you can also do ages(**x) with</a:t>
-            </a:r>
-            <a:r>
-              <a:rPr lang="en-US" baseline="0" dirty="0"/>
-              <a:t> a pre-defined dictionary x and the same functionality runs. </a:t>
-            </a:r>
-            <a:endParaRPr lang="en-US" dirty="0"/>
+              <a:t>Note that you can also do sum(*x) with a pre-defined tuple x and the same functionality runs.</a:t>
+            </a:r>
           </a:p>
         </p:txBody>
       </p:sp>
@@ -537,7 +536,7 @@
             <a:spLocks noGrp="1"/>
           </p:cNvSpPr>
           <p:nvPr>
-            <p:ph type="sldNum" sz="quarter" idx="10"/>
+            <p:ph type="sldNum" sz="quarter" idx="5"/>
           </p:nvPr>
         </p:nvSpPr>
         <p:spPr/>
@@ -547,7 +546,7 @@
           <a:p>
             <a:fld id="{6015BA3D-4842-9A4E-8EED-42DBC3FF31AE}" type="slidenum">
               <a:rPr lang="en-US" smtClean="0"/>
-              <a:t>10</a:t>
+              <a:t>9</a:t>
             </a:fld>
             <a:endParaRPr lang="en-US"/>
           </a:p>
@@ -556,7 +555,7 @@
     </p:spTree>
     <p:extLst>
       <p:ext uri="{BB962C8B-B14F-4D97-AF65-F5344CB8AC3E}">
-        <p14:creationId xmlns:p14="http://schemas.microsoft.com/office/powerpoint/2010/main" val="2068215364"/>
+        <p14:creationId xmlns:p14="http://schemas.microsoft.com/office/powerpoint/2010/main" val="158540734"/>
       </p:ext>
     </p:extLst>
   </p:cSld>
@@ -612,6 +611,106 @@
           <a:p>
             <a:r>
               <a:rPr lang="en-US" dirty="0"/>
+              <a:t>Note that you can also do ages(**x) with</a:t>
+            </a:r>
+            <a:r>
+              <a:rPr lang="en-US" baseline="0" dirty="0"/>
+              <a:t> a pre-defined dictionary x and the same functionality runs. Matplotlib’s API is particularly full of these **</a:t>
+            </a:r>
+            <a:r>
+              <a:rPr lang="en-US" baseline="0" dirty="0" err="1"/>
+              <a:t>kwargs</a:t>
+            </a:r>
+            <a:r>
+              <a:rPr lang="en-US" baseline="0" dirty="0"/>
+              <a:t> constructions, which can get confusing, but to get the keyword arguments your after, simply follow the trail of additional functions that it references.</a:t>
+            </a:r>
+            <a:endParaRPr lang="en-US" dirty="0"/>
+          </a:p>
+        </p:txBody>
+      </p:sp>
+      <p:sp>
+        <p:nvSpPr>
+          <p:cNvPr id="4" name="Slide Number Placeholder 3"/>
+          <p:cNvSpPr>
+            <a:spLocks noGrp="1"/>
+          </p:cNvSpPr>
+          <p:nvPr>
+            <p:ph type="sldNum" sz="quarter" idx="10"/>
+          </p:nvPr>
+        </p:nvSpPr>
+        <p:spPr/>
+        <p:txBody>
+          <a:bodyPr/>
+          <a:lstStyle/>
+          <a:p>
+            <a:fld id="{6015BA3D-4842-9A4E-8EED-42DBC3FF31AE}" type="slidenum">
+              <a:rPr lang="en-US" smtClean="0"/>
+              <a:t>10</a:t>
+            </a:fld>
+            <a:endParaRPr lang="en-US"/>
+          </a:p>
+        </p:txBody>
+      </p:sp>
+    </p:spTree>
+    <p:extLst>
+      <p:ext uri="{BB962C8B-B14F-4D97-AF65-F5344CB8AC3E}">
+        <p14:creationId xmlns:p14="http://schemas.microsoft.com/office/powerpoint/2010/main" val="2068215364"/>
+      </p:ext>
+    </p:extLst>
+  </p:cSld>
+  <p:clrMapOvr>
+    <a:masterClrMapping/>
+  </p:clrMapOvr>
+</p:notes>
+</file>
+
+<file path=ppt/notesSlides/notesSlide3.xml><?xml version="1.0" encoding="utf-8"?>
+<p:notes xmlns:a="http://schemas.openxmlformats.org/drawingml/2006/main" xmlns:r="http://schemas.openxmlformats.org/officeDocument/2006/relationships" xmlns:p="http://schemas.openxmlformats.org/presentationml/2006/main">
+  <p:cSld>
+    <p:spTree>
+      <p:nvGrpSpPr>
+        <p:cNvPr id="1" name=""/>
+        <p:cNvGrpSpPr/>
+        <p:nvPr/>
+      </p:nvGrpSpPr>
+      <p:grpSpPr>
+        <a:xfrm>
+          <a:off x="0" y="0"/>
+          <a:ext cx="0" cy="0"/>
+          <a:chOff x="0" y="0"/>
+          <a:chExt cx="0" cy="0"/>
+        </a:xfrm>
+      </p:grpSpPr>
+      <p:sp>
+        <p:nvSpPr>
+          <p:cNvPr id="2" name="Slide Image Placeholder 1"/>
+          <p:cNvSpPr>
+            <a:spLocks noGrp="1" noRot="1" noChangeAspect="1"/>
+          </p:cNvSpPr>
+          <p:nvPr>
+            <p:ph type="sldImg"/>
+          </p:nvPr>
+        </p:nvSpPr>
+        <p:spPr/>
+      </p:sp>
+      <p:sp>
+        <p:nvSpPr>
+          <p:cNvPr id="3" name="Notes Placeholder 2"/>
+          <p:cNvSpPr>
+            <a:spLocks noGrp="1"/>
+          </p:cNvSpPr>
+          <p:nvPr>
+            <p:ph type="body" idx="1"/>
+          </p:nvPr>
+        </p:nvSpPr>
+        <p:spPr/>
+        <p:txBody>
+          <a:bodyPr/>
+          <a:lstStyle/>
+          <a:p>
+            <a:r>
+              <a:rPr lang="en-US" dirty="0"/>
               <a:t>API: Application Programming Interface </a:t>
             </a:r>
           </a:p>
@@ -644,6 +743,93 @@
     <p:extLst>
       <p:ext uri="{BB962C8B-B14F-4D97-AF65-F5344CB8AC3E}">
         <p14:creationId xmlns:p14="http://schemas.microsoft.com/office/powerpoint/2010/main" val="1158578935"/>
+      </p:ext>
+    </p:extLst>
+  </p:cSld>
+  <p:clrMapOvr>
+    <a:masterClrMapping/>
+  </p:clrMapOvr>
+</p:notes>
+</file>
+
+<file path=ppt/notesSlides/notesSlide4.xml><?xml version="1.0" encoding="utf-8"?>
+<p:notes xmlns:a="http://schemas.openxmlformats.org/drawingml/2006/main" xmlns:r="http://schemas.openxmlformats.org/officeDocument/2006/relationships" xmlns:p="http://schemas.openxmlformats.org/presentationml/2006/main">
+  <p:cSld>
+    <p:spTree>
+      <p:nvGrpSpPr>
+        <p:cNvPr id="1" name=""/>
+        <p:cNvGrpSpPr/>
+        <p:nvPr/>
+      </p:nvGrpSpPr>
+      <p:grpSpPr>
+        <a:xfrm>
+          <a:off x="0" y="0"/>
+          <a:ext cx="0" cy="0"/>
+          <a:chOff x="0" y="0"/>
+          <a:chExt cx="0" cy="0"/>
+        </a:xfrm>
+      </p:grpSpPr>
+      <p:sp>
+        <p:nvSpPr>
+          <p:cNvPr id="2" name="Slide Image Placeholder 1"/>
+          <p:cNvSpPr>
+            <a:spLocks noGrp="1" noRot="1" noChangeAspect="1"/>
+          </p:cNvSpPr>
+          <p:nvPr>
+            <p:ph type="sldImg"/>
+          </p:nvPr>
+        </p:nvSpPr>
+        <p:spPr/>
+      </p:sp>
+      <p:sp>
+        <p:nvSpPr>
+          <p:cNvPr id="3" name="Notes Placeholder 2"/>
+          <p:cNvSpPr>
+            <a:spLocks noGrp="1"/>
+          </p:cNvSpPr>
+          <p:nvPr>
+            <p:ph type="body" idx="1"/>
+          </p:nvPr>
+        </p:nvSpPr>
+        <p:spPr/>
+        <p:txBody>
+          <a:bodyPr/>
+          <a:lstStyle/>
+          <a:p>
+            <a:r>
+              <a:rPr lang="en-US" dirty="0"/>
+              <a:t>Remind them that you can pipe this to a PDF and send it to your collaborators.</a:t>
+            </a:r>
+          </a:p>
+        </p:txBody>
+      </p:sp>
+      <p:sp>
+        <p:nvSpPr>
+          <p:cNvPr id="4" name="Slide Number Placeholder 3"/>
+          <p:cNvSpPr>
+            <a:spLocks noGrp="1"/>
+          </p:cNvSpPr>
+          <p:nvPr>
+            <p:ph type="sldNum" sz="quarter" idx="5"/>
+          </p:nvPr>
+        </p:nvSpPr>
+        <p:spPr/>
+        <p:txBody>
+          <a:bodyPr/>
+          <a:lstStyle/>
+          <a:p>
+            <a:fld id="{6015BA3D-4842-9A4E-8EED-42DBC3FF31AE}" type="slidenum">
+              <a:rPr lang="en-US" smtClean="0"/>
+              <a:t>14</a:t>
+            </a:fld>
+            <a:endParaRPr lang="en-US"/>
+          </a:p>
+        </p:txBody>
+      </p:sp>
+    </p:spTree>
+    <p:extLst>
+      <p:ext uri="{BB962C8B-B14F-4D97-AF65-F5344CB8AC3E}">
+        <p14:creationId xmlns:p14="http://schemas.microsoft.com/office/powerpoint/2010/main" val="2151466782"/>
       </p:ext>
     </p:extLst>
   </p:cSld>
@@ -929,7 +1115,7 @@
           <a:p>
             <a:fld id="{51673806-0BCD-1F42-BAA8-2011034B3C6A}" type="datetimeFigureOut">
               <a:rPr lang="en-US" smtClean="0"/>
-              <a:t>5/8/22</a:t>
+              <a:t>5/10/22</a:t>
             </a:fld>
             <a:endParaRPr lang="en-US"/>
           </a:p>
@@ -1343,7 +1529,7 @@
           <a:p>
             <a:fld id="{51673806-0BCD-1F42-BAA8-2011034B3C6A}" type="datetimeFigureOut">
               <a:rPr lang="en-US" smtClean="0"/>
-              <a:t>5/8/22</a:t>
+              <a:t>5/10/22</a:t>
             </a:fld>
             <a:endParaRPr lang="en-US"/>
           </a:p>
@@ -1674,7 +1860,7 @@
           <a:p>
             <a:fld id="{51673806-0BCD-1F42-BAA8-2011034B3C6A}" type="datetimeFigureOut">
               <a:rPr lang="en-US" smtClean="0"/>
-              <a:t>5/8/22</a:t>
+              <a:t>5/10/22</a:t>
             </a:fld>
             <a:endParaRPr lang="en-US"/>
           </a:p>
@@ -2074,7 +2260,7 @@
           <a:p>
             <a:fld id="{51673806-0BCD-1F42-BAA8-2011034B3C6A}" type="datetimeFigureOut">
               <a:rPr lang="en-US" smtClean="0"/>
-              <a:t>5/8/22</a:t>
+              <a:t>5/10/22</a:t>
             </a:fld>
             <a:endParaRPr lang="en-US"/>
           </a:p>
@@ -2637,7 +2823,7 @@
           <a:p>
             <a:fld id="{51673806-0BCD-1F42-BAA8-2011034B3C6A}" type="datetimeFigureOut">
               <a:rPr lang="en-US" smtClean="0"/>
-              <a:t>5/8/22</a:t>
+              <a:t>5/10/22</a:t>
             </a:fld>
             <a:endParaRPr lang="en-US"/>
           </a:p>
@@ -3313,7 +3499,7 @@
           <a:p>
             <a:fld id="{51673806-0BCD-1F42-BAA8-2011034B3C6A}" type="datetimeFigureOut">
               <a:rPr lang="en-US" smtClean="0"/>
-              <a:t>5/8/22</a:t>
+              <a:t>5/10/22</a:t>
             </a:fld>
             <a:endParaRPr lang="en-US"/>
           </a:p>
@@ -4221,7 +4407,7 @@
           <a:p>
             <a:fld id="{51673806-0BCD-1F42-BAA8-2011034B3C6A}" type="datetimeFigureOut">
               <a:rPr lang="en-US" smtClean="0"/>
-              <a:t>5/8/22</a:t>
+              <a:t>5/10/22</a:t>
             </a:fld>
             <a:endParaRPr lang="en-US"/>
           </a:p>
@@ -4529,7 +4715,7 @@
           <a:p>
             <a:fld id="{51673806-0BCD-1F42-BAA8-2011034B3C6A}" type="datetimeFigureOut">
               <a:rPr lang="en-US" smtClean="0"/>
-              <a:t>5/8/22</a:t>
+              <a:t>5/10/22</a:t>
             </a:fld>
             <a:endParaRPr lang="en-US"/>
           </a:p>
@@ -4788,7 +4974,7 @@
           <a:p>
             <a:fld id="{51673806-0BCD-1F42-BAA8-2011034B3C6A}" type="datetimeFigureOut">
               <a:rPr lang="en-US" smtClean="0"/>
-              <a:t>5/8/22</a:t>
+              <a:t>5/10/22</a:t>
             </a:fld>
             <a:endParaRPr lang="en-US"/>
           </a:p>
@@ -5111,7 +5297,7 @@
           <a:p>
             <a:fld id="{51673806-0BCD-1F42-BAA8-2011034B3C6A}" type="datetimeFigureOut">
               <a:rPr lang="en-US" smtClean="0"/>
-              <a:t>5/8/22</a:t>
+              <a:t>5/10/22</a:t>
             </a:fld>
             <a:endParaRPr lang="en-US"/>
           </a:p>
@@ -5495,7 +5681,7 @@
           <a:p>
             <a:fld id="{51673806-0BCD-1F42-BAA8-2011034B3C6A}" type="datetimeFigureOut">
               <a:rPr lang="en-US" smtClean="0"/>
-              <a:t>5/8/22</a:t>
+              <a:t>5/10/22</a:t>
             </a:fld>
             <a:endParaRPr lang="en-US"/>
           </a:p>
@@ -5871,7 +6057,7 @@
           <a:p>
             <a:fld id="{51673806-0BCD-1F42-BAA8-2011034B3C6A}" type="datetimeFigureOut">
               <a:rPr lang="en-US" smtClean="0"/>
-              <a:t>5/8/22</a:t>
+              <a:t>5/10/22</a:t>
             </a:fld>
             <a:endParaRPr lang="en-US"/>
           </a:p>
@@ -6377,7 +6563,7 @@
           <a:p>
             <a:fld id="{51673806-0BCD-1F42-BAA8-2011034B3C6A}" type="datetimeFigureOut">
               <a:rPr lang="en-US" smtClean="0"/>
-              <a:t>5/8/22</a:t>
+              <a:t>5/10/22</a:t>
             </a:fld>
             <a:endParaRPr lang="en-US"/>
           </a:p>
@@ -6634,7 +6820,7 @@
           <a:p>
             <a:fld id="{51673806-0BCD-1F42-BAA8-2011034B3C6A}" type="datetimeFigureOut">
               <a:rPr lang="en-US" smtClean="0"/>
-              <a:t>5/8/22</a:t>
+              <a:t>5/10/22</a:t>
             </a:fld>
             <a:endParaRPr lang="en-US"/>
           </a:p>
@@ -6792,7 +6978,7 @@
           <a:p>
             <a:fld id="{51673806-0BCD-1F42-BAA8-2011034B3C6A}" type="datetimeFigureOut">
               <a:rPr lang="en-US" smtClean="0"/>
-              <a:t>5/8/22</a:t>
+              <a:t>5/10/22</a:t>
             </a:fld>
             <a:endParaRPr lang="en-US"/>
           </a:p>
@@ -7182,7 +7368,7 @@
           <a:p>
             <a:fld id="{51673806-0BCD-1F42-BAA8-2011034B3C6A}" type="datetimeFigureOut">
               <a:rPr lang="en-US" smtClean="0"/>
-              <a:t>5/8/22</a:t>
+              <a:t>5/10/22</a:t>
             </a:fld>
             <a:endParaRPr lang="en-US"/>
           </a:p>
@@ -7591,7 +7777,7 @@
           <a:p>
             <a:fld id="{51673806-0BCD-1F42-BAA8-2011034B3C6A}" type="datetimeFigureOut">
               <a:rPr lang="en-US" smtClean="0"/>
-              <a:t>5/8/22</a:t>
+              <a:t>5/10/22</a:t>
             </a:fld>
             <a:endParaRPr lang="en-US"/>
           </a:p>
@@ -7837,7 +8023,7 @@
             <a:fld id="{51673806-0BCD-1F42-BAA8-2011034B3C6A}" type="datetimeFigureOut">
               <a:rPr lang="en-US" smtClean="0"/>
               <a:pPr/>
-              <a:t>5/8/22</a:t>
+              <a:t>5/10/22</a:t>
             </a:fld>
             <a:endParaRPr lang="en-US" dirty="0"/>
           </a:p>
@@ -8658,6 +8844,542 @@
 </p:sld>
 </file>
 
+<file path=ppt/slides/slide12.xml><?xml version="1.0" encoding="utf-8"?>
+<p:sld xmlns:a="http://schemas.openxmlformats.org/drawingml/2006/main" xmlns:r="http://schemas.openxmlformats.org/officeDocument/2006/relationships" xmlns:p="http://schemas.openxmlformats.org/presentationml/2006/main">
+  <p:cSld>
+    <p:spTree>
+      <p:nvGrpSpPr>
+        <p:cNvPr id="1" name=""/>
+        <p:cNvGrpSpPr/>
+        <p:nvPr/>
+      </p:nvGrpSpPr>
+      <p:grpSpPr>
+        <a:xfrm>
+          <a:off x="0" y="0"/>
+          <a:ext cx="0" cy="0"/>
+          <a:chOff x="0" y="0"/>
+          <a:chExt cx="0" cy="0"/>
+        </a:xfrm>
+      </p:grpSpPr>
+      <p:sp>
+        <p:nvSpPr>
+          <p:cNvPr id="2" name="Title 1">
+            <a:extLst>
+              <a:ext uri="{FF2B5EF4-FFF2-40B4-BE49-F238E27FC236}">
+                <a16:creationId xmlns:a16="http://schemas.microsoft.com/office/drawing/2014/main" id="{0FBD9646-978A-7D4C-A4A5-DAB3BB709047}"/>
+              </a:ext>
+            </a:extLst>
+          </p:cNvPr>
+          <p:cNvSpPr>
+            <a:spLocks noGrp="1"/>
+          </p:cNvSpPr>
+          <p:nvPr>
+            <p:ph type="title"/>
+          </p:nvPr>
+        </p:nvSpPr>
+        <p:spPr/>
+        <p:txBody>
+          <a:bodyPr/>
+          <a:lstStyle/>
+          <a:p>
+            <a:r>
+              <a:rPr lang="en-US" dirty="0"/>
+              <a:t>Markdown</a:t>
+            </a:r>
+          </a:p>
+        </p:txBody>
+      </p:sp>
+      <p:sp>
+        <p:nvSpPr>
+          <p:cNvPr id="3" name="Content Placeholder 2">
+            <a:extLst>
+              <a:ext uri="{FF2B5EF4-FFF2-40B4-BE49-F238E27FC236}">
+                <a16:creationId xmlns:a16="http://schemas.microsoft.com/office/drawing/2014/main" id="{17914DC0-ABEF-5E46-BAC6-BE33494C78F0}"/>
+              </a:ext>
+            </a:extLst>
+          </p:cNvPr>
+          <p:cNvSpPr>
+            <a:spLocks noGrp="1"/>
+          </p:cNvSpPr>
+          <p:nvPr>
+            <p:ph idx="1"/>
+          </p:nvPr>
+        </p:nvSpPr>
+        <p:spPr>
+          <a:xfrm>
+            <a:off x="255319" y="2092175"/>
+            <a:ext cx="11773549" cy="4617718"/>
+          </a:xfrm>
+        </p:spPr>
+        <p:txBody>
+          <a:bodyPr>
+            <a:normAutofit/>
+          </a:bodyPr>
+          <a:lstStyle/>
+          <a:p>
+            <a:pPr marL="0" indent="0">
+              <a:buNone/>
+            </a:pPr>
+            <a:r>
+              <a:rPr lang="en-US" sz="2300" dirty="0"/>
+              <a:t>Another markup/type-setting language (RST and HTML are also markup languages)</a:t>
+            </a:r>
+          </a:p>
+          <a:p>
+            <a:pPr marL="0" indent="0">
+              <a:buNone/>
+            </a:pPr>
+            <a:endParaRPr lang="en-US" sz="2300" dirty="0"/>
+          </a:p>
+          <a:p>
+            <a:pPr marL="0" indent="0">
+              <a:buNone/>
+            </a:pPr>
+            <a:r>
+              <a:rPr lang="en-US" sz="2300" dirty="0"/>
+              <a:t>Can be written directly within </a:t>
+            </a:r>
+            <a:r>
+              <a:rPr lang="en-US" sz="2300" dirty="0" err="1"/>
+              <a:t>jupyter</a:t>
+            </a:r>
+            <a:r>
+              <a:rPr lang="en-US" sz="2300" dirty="0"/>
+              <a:t> notebooks via </a:t>
+            </a:r>
+            <a:r>
+              <a:rPr lang="en-US" sz="2300" i="1" dirty="0"/>
+              <a:t>Cell &gt; Cell Type &gt; Markdown</a:t>
+            </a:r>
+            <a:endParaRPr lang="en-US" sz="2300" dirty="0"/>
+          </a:p>
+          <a:p>
+            <a:pPr marL="0" indent="0">
+              <a:buNone/>
+            </a:pPr>
+            <a:endParaRPr lang="en-US" sz="2300" dirty="0"/>
+          </a:p>
+          <a:p>
+            <a:pPr marL="0" indent="0">
+              <a:buNone/>
+            </a:pPr>
+            <a:r>
+              <a:rPr lang="en-US" sz="2300" dirty="0"/>
+              <a:t>Can embed hyperlinks to specific locations within your notebook or to external webpages</a:t>
+            </a:r>
+          </a:p>
+          <a:p>
+            <a:pPr marL="0" indent="0">
+              <a:buNone/>
+            </a:pPr>
+            <a:endParaRPr lang="en-US" sz="2300" dirty="0"/>
+          </a:p>
+          <a:p>
+            <a:pPr marL="0" indent="0">
+              <a:buNone/>
+            </a:pPr>
+            <a:r>
+              <a:rPr lang="en-US" sz="2300" dirty="0"/>
+              <a:t>Can include LaTeX math-type and raw HTML</a:t>
+            </a:r>
+          </a:p>
+          <a:p>
+            <a:pPr marL="0" indent="0">
+              <a:buNone/>
+            </a:pPr>
+            <a:endParaRPr lang="en-US" sz="2300" dirty="0"/>
+          </a:p>
+          <a:p>
+            <a:pPr marL="0" indent="0">
+              <a:buNone/>
+            </a:pPr>
+            <a:r>
+              <a:rPr lang="en-US" sz="2300" dirty="0"/>
+              <a:t>By including markdown cells within your </a:t>
+            </a:r>
+            <a:r>
+              <a:rPr lang="en-US" sz="2300" dirty="0" err="1"/>
+              <a:t>jupyter</a:t>
+            </a:r>
+            <a:r>
+              <a:rPr lang="en-US" sz="2300" dirty="0"/>
+              <a:t> notebooks and then exporting to a PDF via </a:t>
+            </a:r>
+            <a:r>
+              <a:rPr lang="en-US" sz="2300" i="1" dirty="0"/>
+              <a:t>File &gt; Download as &gt; PDF via LaTeX (.pdf)</a:t>
+            </a:r>
+            <a:r>
+              <a:rPr lang="en-US" sz="2300" dirty="0"/>
+              <a:t>, you can easily make type-set notes for collaborators</a:t>
+            </a:r>
+          </a:p>
+        </p:txBody>
+      </p:sp>
+    </p:spTree>
+    <p:extLst>
+      <p:ext uri="{BB962C8B-B14F-4D97-AF65-F5344CB8AC3E}">
+        <p14:creationId xmlns:p14="http://schemas.microsoft.com/office/powerpoint/2010/main" val="4190781962"/>
+      </p:ext>
+    </p:extLst>
+  </p:cSld>
+  <p:clrMapOvr>
+    <a:masterClrMapping/>
+  </p:clrMapOvr>
+</p:sld>
+</file>
+
+<file path=ppt/slides/slide13.xml><?xml version="1.0" encoding="utf-8"?>
+<p:sld xmlns:a="http://schemas.openxmlformats.org/drawingml/2006/main" xmlns:r="http://schemas.openxmlformats.org/officeDocument/2006/relationships" xmlns:p="http://schemas.openxmlformats.org/presentationml/2006/main">
+  <p:cSld>
+    <p:spTree>
+      <p:nvGrpSpPr>
+        <p:cNvPr id="1" name=""/>
+        <p:cNvGrpSpPr/>
+        <p:nvPr/>
+      </p:nvGrpSpPr>
+      <p:grpSpPr>
+        <a:xfrm>
+          <a:off x="0" y="0"/>
+          <a:ext cx="0" cy="0"/>
+          <a:chOff x="0" y="0"/>
+          <a:chExt cx="0" cy="0"/>
+        </a:xfrm>
+      </p:grpSpPr>
+      <p:sp>
+        <p:nvSpPr>
+          <p:cNvPr id="2" name="Title 1">
+            <a:extLst>
+              <a:ext uri="{FF2B5EF4-FFF2-40B4-BE49-F238E27FC236}">
+                <a16:creationId xmlns:a16="http://schemas.microsoft.com/office/drawing/2014/main" id="{0FBD9646-978A-7D4C-A4A5-DAB3BB709047}"/>
+              </a:ext>
+            </a:extLst>
+          </p:cNvPr>
+          <p:cNvSpPr>
+            <a:spLocks noGrp="1"/>
+          </p:cNvSpPr>
+          <p:nvPr>
+            <p:ph type="title"/>
+          </p:nvPr>
+        </p:nvSpPr>
+        <p:spPr/>
+        <p:txBody>
+          <a:bodyPr/>
+          <a:lstStyle/>
+          <a:p>
+            <a:r>
+              <a:rPr lang="en-US" dirty="0"/>
+              <a:t>Markdown</a:t>
+            </a:r>
+          </a:p>
+        </p:txBody>
+      </p:sp>
+      <p:pic>
+        <p:nvPicPr>
+          <p:cNvPr id="7" name="Picture 6" descr="Graphical user interface, text, application, email&#10;&#10;Description automatically generated">
+            <a:extLst>
+              <a:ext uri="{FF2B5EF4-FFF2-40B4-BE49-F238E27FC236}">
+                <a16:creationId xmlns:a16="http://schemas.microsoft.com/office/drawing/2014/main" id="{F84ACC30-534B-8540-887A-6D727A73975E}"/>
+              </a:ext>
+            </a:extLst>
+          </p:cNvPr>
+          <p:cNvPicPr>
+            <a:picLocks noChangeAspect="1"/>
+          </p:cNvPicPr>
+          <p:nvPr/>
+        </p:nvPicPr>
+        <p:blipFill>
+          <a:blip r:embed="rId2"/>
+          <a:stretch>
+            <a:fillRect/>
+          </a:stretch>
+        </p:blipFill>
+        <p:spPr>
+          <a:xfrm>
+            <a:off x="0" y="2139725"/>
+            <a:ext cx="12192000" cy="4587653"/>
+          </a:xfrm>
+          <a:prstGeom prst="rect">
+            <a:avLst/>
+          </a:prstGeom>
+        </p:spPr>
+      </p:pic>
+    </p:spTree>
+    <p:extLst>
+      <p:ext uri="{BB962C8B-B14F-4D97-AF65-F5344CB8AC3E}">
+        <p14:creationId xmlns:p14="http://schemas.microsoft.com/office/powerpoint/2010/main" val="2408824824"/>
+      </p:ext>
+    </p:extLst>
+  </p:cSld>
+  <p:clrMapOvr>
+    <a:masterClrMapping/>
+  </p:clrMapOvr>
+</p:sld>
+</file>
+
+<file path=ppt/slides/slide14.xml><?xml version="1.0" encoding="utf-8"?>
+<p:sld xmlns:a="http://schemas.openxmlformats.org/drawingml/2006/main" xmlns:r="http://schemas.openxmlformats.org/officeDocument/2006/relationships" xmlns:p="http://schemas.openxmlformats.org/presentationml/2006/main">
+  <p:cSld>
+    <p:spTree>
+      <p:nvGrpSpPr>
+        <p:cNvPr id="1" name=""/>
+        <p:cNvGrpSpPr/>
+        <p:nvPr/>
+      </p:nvGrpSpPr>
+      <p:grpSpPr>
+        <a:xfrm>
+          <a:off x="0" y="0"/>
+          <a:ext cx="0" cy="0"/>
+          <a:chOff x="0" y="0"/>
+          <a:chExt cx="0" cy="0"/>
+        </a:xfrm>
+      </p:grpSpPr>
+      <p:sp>
+        <p:nvSpPr>
+          <p:cNvPr id="2" name="Title 1">
+            <a:extLst>
+              <a:ext uri="{FF2B5EF4-FFF2-40B4-BE49-F238E27FC236}">
+                <a16:creationId xmlns:a16="http://schemas.microsoft.com/office/drawing/2014/main" id="{0FBD9646-978A-7D4C-A4A5-DAB3BB709047}"/>
+              </a:ext>
+            </a:extLst>
+          </p:cNvPr>
+          <p:cNvSpPr>
+            <a:spLocks noGrp="1"/>
+          </p:cNvSpPr>
+          <p:nvPr>
+            <p:ph type="title"/>
+          </p:nvPr>
+        </p:nvSpPr>
+        <p:spPr/>
+        <p:txBody>
+          <a:bodyPr/>
+          <a:lstStyle/>
+          <a:p>
+            <a:r>
+              <a:rPr lang="en-US" dirty="0"/>
+              <a:t>Markdown</a:t>
+            </a:r>
+          </a:p>
+        </p:txBody>
+      </p:sp>
+      <p:pic>
+        <p:nvPicPr>
+          <p:cNvPr id="4" name="Picture 3" descr="Text&#10;&#10;Description automatically generated">
+            <a:extLst>
+              <a:ext uri="{FF2B5EF4-FFF2-40B4-BE49-F238E27FC236}">
+                <a16:creationId xmlns:a16="http://schemas.microsoft.com/office/drawing/2014/main" id="{8A3FAB2A-4A43-FD44-B956-89D087D46A3D}"/>
+              </a:ext>
+            </a:extLst>
+          </p:cNvPr>
+          <p:cNvPicPr>
+            <a:picLocks noChangeAspect="1"/>
+          </p:cNvPicPr>
+          <p:nvPr/>
+        </p:nvPicPr>
+        <p:blipFill>
+          <a:blip r:embed="rId3"/>
+          <a:stretch>
+            <a:fillRect/>
+          </a:stretch>
+        </p:blipFill>
+        <p:spPr>
+          <a:xfrm>
+            <a:off x="0" y="2220291"/>
+            <a:ext cx="12192000" cy="3884481"/>
+          </a:xfrm>
+          <a:prstGeom prst="rect">
+            <a:avLst/>
+          </a:prstGeom>
+        </p:spPr>
+      </p:pic>
+      <p:sp>
+        <p:nvSpPr>
+          <p:cNvPr id="6" name="Content Placeholder 2">
+            <a:extLst>
+              <a:ext uri="{FF2B5EF4-FFF2-40B4-BE49-F238E27FC236}">
+                <a16:creationId xmlns:a16="http://schemas.microsoft.com/office/drawing/2014/main" id="{9886CDB7-8488-6A45-8437-5ED66E7ABA1B}"/>
+              </a:ext>
+            </a:extLst>
+          </p:cNvPr>
+          <p:cNvSpPr>
+            <a:spLocks noGrp="1"/>
+          </p:cNvSpPr>
+          <p:nvPr>
+            <p:ph idx="1"/>
+          </p:nvPr>
+        </p:nvSpPr>
+        <p:spPr>
+          <a:xfrm>
+            <a:off x="0" y="6394362"/>
+            <a:ext cx="11822805" cy="463638"/>
+          </a:xfrm>
+        </p:spPr>
+        <p:txBody>
+          <a:bodyPr>
+            <a:normAutofit/>
+          </a:bodyPr>
+          <a:lstStyle/>
+          <a:p>
+            <a:pPr marL="0" indent="0">
+              <a:buNone/>
+            </a:pPr>
+            <a:r>
+              <a:rPr lang="en-US" sz="2000" dirty="0"/>
+              <a:t>Markdown can also include images and tables. Reference: </a:t>
+            </a:r>
+            <a:r>
+              <a:rPr lang="en-US" sz="2000" dirty="0">
+                <a:hlinkClick r:id="rId4"/>
+              </a:rPr>
+              <a:t>https://www.markdownguide.org/basic-syntax/</a:t>
+            </a:r>
+            <a:r>
+              <a:rPr lang="en-US" sz="2000" dirty="0"/>
+              <a:t> </a:t>
+            </a:r>
+          </a:p>
+        </p:txBody>
+      </p:sp>
+    </p:spTree>
+    <p:extLst>
+      <p:ext uri="{BB962C8B-B14F-4D97-AF65-F5344CB8AC3E}">
+        <p14:creationId xmlns:p14="http://schemas.microsoft.com/office/powerpoint/2010/main" val="727450340"/>
+      </p:ext>
+    </p:extLst>
+  </p:cSld>
+  <p:clrMapOvr>
+    <a:masterClrMapping/>
+  </p:clrMapOvr>
+</p:sld>
+</file>
+
+<file path=ppt/slides/slide15.xml><?xml version="1.0" encoding="utf-8"?>
+<p:sld xmlns:a="http://schemas.openxmlformats.org/drawingml/2006/main" xmlns:r="http://schemas.openxmlformats.org/officeDocument/2006/relationships" xmlns:p="http://schemas.openxmlformats.org/presentationml/2006/main">
+  <p:cSld>
+    <p:spTree>
+      <p:nvGrpSpPr>
+        <p:cNvPr id="1" name=""/>
+        <p:cNvGrpSpPr/>
+        <p:nvPr/>
+      </p:nvGrpSpPr>
+      <p:grpSpPr>
+        <a:xfrm>
+          <a:off x="0" y="0"/>
+          <a:ext cx="0" cy="0"/>
+          <a:chOff x="0" y="0"/>
+          <a:chExt cx="0" cy="0"/>
+        </a:xfrm>
+      </p:grpSpPr>
+      <p:sp>
+        <p:nvSpPr>
+          <p:cNvPr id="2" name="Title 1">
+            <a:extLst>
+              <a:ext uri="{FF2B5EF4-FFF2-40B4-BE49-F238E27FC236}">
+                <a16:creationId xmlns:a16="http://schemas.microsoft.com/office/drawing/2014/main" id="{E75EC5F5-D7C1-A644-AC75-EDE01AE87C55}"/>
+              </a:ext>
+            </a:extLst>
+          </p:cNvPr>
+          <p:cNvSpPr>
+            <a:spLocks noGrp="1"/>
+          </p:cNvSpPr>
+          <p:nvPr>
+            <p:ph type="title"/>
+          </p:nvPr>
+        </p:nvSpPr>
+        <p:spPr/>
+        <p:txBody>
+          <a:bodyPr/>
+          <a:lstStyle/>
+          <a:p>
+            <a:r>
+              <a:rPr lang="en-US" dirty="0"/>
+              <a:t>Markdown: Stepping-Stone to Web Development</a:t>
+            </a:r>
+          </a:p>
+        </p:txBody>
+      </p:sp>
+      <p:sp>
+        <p:nvSpPr>
+          <p:cNvPr id="3" name="Content Placeholder 2">
+            <a:extLst>
+              <a:ext uri="{FF2B5EF4-FFF2-40B4-BE49-F238E27FC236}">
+                <a16:creationId xmlns:a16="http://schemas.microsoft.com/office/drawing/2014/main" id="{560F8811-A94E-064F-BC0A-4814464D57A2}"/>
+              </a:ext>
+            </a:extLst>
+          </p:cNvPr>
+          <p:cNvSpPr>
+            <a:spLocks noGrp="1"/>
+          </p:cNvSpPr>
+          <p:nvPr>
+            <p:ph idx="1"/>
+          </p:nvPr>
+        </p:nvSpPr>
+        <p:spPr>
+          <a:xfrm>
+            <a:off x="680321" y="2336873"/>
+            <a:ext cx="9613861" cy="3960896"/>
+          </a:xfrm>
+        </p:spPr>
+        <p:txBody>
+          <a:bodyPr/>
+          <a:lstStyle/>
+          <a:p>
+            <a:pPr marL="0" indent="0">
+              <a:buNone/>
+            </a:pPr>
+            <a:r>
+              <a:rPr lang="en-US" dirty="0"/>
+              <a:t>You can build websites in markdown using GitHub Pages</a:t>
+            </a:r>
+          </a:p>
+          <a:p>
+            <a:pPr lvl="1"/>
+            <a:r>
+              <a:rPr lang="en-US" dirty="0"/>
+              <a:t>Having a nice professional website is proving to be increasingly important for getting a foothold in many industries, academia included</a:t>
+            </a:r>
+          </a:p>
+          <a:p>
+            <a:pPr lvl="1"/>
+            <a:r>
+              <a:rPr lang="en-US" dirty="0"/>
+              <a:t>Because you can include raw HTML directly within markdown, it’s a stone’s throw from CSS and JavaScript, the more “bare bones” tools of web development</a:t>
+            </a:r>
+          </a:p>
+          <a:p>
+            <a:pPr lvl="1"/>
+            <a:endParaRPr lang="en-US" dirty="0"/>
+          </a:p>
+          <a:p>
+            <a:pPr marL="0" indent="0">
+              <a:buNone/>
+            </a:pPr>
+            <a:endParaRPr lang="en-US" dirty="0"/>
+          </a:p>
+          <a:p>
+            <a:pPr marL="0" indent="0">
+              <a:buNone/>
+            </a:pPr>
+            <a:r>
+              <a:rPr lang="en-US" dirty="0"/>
+              <a:t>We’ll talk a little bit about GitHub in the last session!</a:t>
+            </a:r>
+          </a:p>
+        </p:txBody>
+      </p:sp>
+    </p:spTree>
+    <p:extLst>
+      <p:ext uri="{BB962C8B-B14F-4D97-AF65-F5344CB8AC3E}">
+        <p14:creationId xmlns:p14="http://schemas.microsoft.com/office/powerpoint/2010/main" val="3842166629"/>
+      </p:ext>
+    </p:extLst>
+  </p:cSld>
+  <p:clrMapOvr>
+    <a:masterClrMapping/>
+  </p:clrMapOvr>
+</p:sld>
+</file>
+
 <file path=ppt/slides/slide2.xml><?xml version="1.0" encoding="utf-8"?>
 <p:sld xmlns:a="http://schemas.openxmlformats.org/drawingml/2006/main" xmlns:r="http://schemas.openxmlformats.org/officeDocument/2006/relationships" xmlns:p="http://schemas.openxmlformats.org/presentationml/2006/main">
   <p:cSld>
@@ -9694,12 +10416,14 @@
         </p:nvSpPr>
         <p:spPr>
           <a:xfrm>
-            <a:off x="680322" y="2336873"/>
-            <a:ext cx="5788718" cy="3599316"/>
-          </a:xfrm>
-        </p:spPr>
-        <p:txBody>
-          <a:bodyPr/>
+            <a:off x="293306" y="1985963"/>
+            <a:ext cx="6175733" cy="4872038"/>
+          </a:xfrm>
+        </p:spPr>
+        <p:txBody>
+          <a:bodyPr>
+            <a:normAutofit/>
+          </a:bodyPr>
           <a:lstStyle/>
           <a:p>
             <a:pPr marL="457200" indent="-457200">
@@ -9751,6 +10475,37 @@
             <a:r>
               <a:rPr lang="en-US" dirty="0"/>
               <a:t>Example code </a:t>
+            </a:r>
+          </a:p>
+          <a:p>
+            <a:pPr marL="0" indent="0">
+              <a:buNone/>
+            </a:pPr>
+            <a:endParaRPr lang="en-US" dirty="0"/>
+          </a:p>
+          <a:p>
+            <a:pPr marL="0" indent="0">
+              <a:buNone/>
+            </a:pPr>
+            <a:r>
+              <a:rPr lang="en-US" dirty="0"/>
+              <a:t>Math is written with </a:t>
+            </a:r>
+            <a:r>
+              <a:rPr lang="en-US" i="1" dirty="0"/>
+              <a:t>:math:</a:t>
+            </a:r>
+            <a:r>
+              <a:rPr lang="en-US" dirty="0"/>
+              <a:t> followed by LaTeX style escape sequences within `` (e.g. </a:t>
+            </a:r>
+            <a:r>
+              <a:rPr lang="en-US" i="1" dirty="0"/>
+              <a:t>:math:`\eta`</a:t>
+            </a:r>
+            <a:r>
+              <a:rPr lang="en-US" dirty="0"/>
+              <a:t>)</a:t>
             </a:r>
           </a:p>
         </p:txBody>
@@ -10064,7 +10819,7 @@
           <p:nvPr/>
         </p:nvPicPr>
         <p:blipFill>
-          <a:blip r:embed="rId2">
+          <a:blip r:embed="rId3">
             <a:extLst>
               <a:ext uri="{28A0092B-C50C-407E-A947-70E740481C1C}">
                 <a14:useLocalDpi xmlns:a14="http://schemas.microsoft.com/office/drawing/2010/main" val="0"/>

</xml_diff>